<commit_message>
MA Public School Data Analysis
</commit_message>
<xml_diff>
--- a/MA_public_schools.pptx
+++ b/MA_public_schools.pptx
@@ -333,7 +333,7 @@
           <a:p>
             <a:fld id="{28424D98-A9C0-4FAB-B998-D42542D3343D}" type="datetimeFigureOut">
               <a:rPr lang="en-US" smtClean="0"/>
-              <a:t>6/24/20</a:t>
+              <a:t>6/26/20</a:t>
             </a:fld>
             <a:endParaRPr lang="en-US"/>
           </a:p>
@@ -497,7 +497,7 @@
           <a:p>
             <a:fld id="{28424D98-A9C0-4FAB-B998-D42542D3343D}" type="datetimeFigureOut">
               <a:rPr lang="en-US" smtClean="0"/>
-              <a:t>6/24/20</a:t>
+              <a:t>6/26/20</a:t>
             </a:fld>
             <a:endParaRPr lang="en-US"/>
           </a:p>
@@ -671,7 +671,7 @@
           <a:p>
             <a:fld id="{28424D98-A9C0-4FAB-B998-D42542D3343D}" type="datetimeFigureOut">
               <a:rPr lang="en-US" smtClean="0"/>
-              <a:t>6/24/20</a:t>
+              <a:t>6/26/20</a:t>
             </a:fld>
             <a:endParaRPr lang="en-US"/>
           </a:p>
@@ -854,7 +854,7 @@
           <a:p>
             <a:fld id="{28424D98-A9C0-4FAB-B998-D42542D3343D}" type="datetimeFigureOut">
               <a:rPr lang="en-US" smtClean="0"/>
-              <a:t>6/24/20</a:t>
+              <a:t>6/26/20</a:t>
             </a:fld>
             <a:endParaRPr lang="en-US"/>
           </a:p>
@@ -1116,7 +1116,7 @@
           <a:p>
             <a:fld id="{28424D98-A9C0-4FAB-B998-D42542D3343D}" type="datetimeFigureOut">
               <a:rPr lang="en-US" smtClean="0"/>
-              <a:t>6/24/20</a:t>
+              <a:t>6/26/20</a:t>
             </a:fld>
             <a:endParaRPr lang="en-US"/>
           </a:p>
@@ -1463,7 +1463,7 @@
           <a:p>
             <a:fld id="{28424D98-A9C0-4FAB-B998-D42542D3343D}" type="datetimeFigureOut">
               <a:rPr lang="en-US" smtClean="0"/>
-              <a:t>6/24/20</a:t>
+              <a:t>6/26/20</a:t>
             </a:fld>
             <a:endParaRPr lang="en-US"/>
           </a:p>
@@ -1769,7 +1769,7 @@
           <a:p>
             <a:fld id="{28424D98-A9C0-4FAB-B998-D42542D3343D}" type="datetimeFigureOut">
               <a:rPr lang="en-US" smtClean="0"/>
-              <a:t>6/24/20</a:t>
+              <a:t>6/26/20</a:t>
             </a:fld>
             <a:endParaRPr lang="en-US"/>
           </a:p>
@@ -1996,7 +1996,7 @@
           <a:p>
             <a:fld id="{28424D98-A9C0-4FAB-B998-D42542D3343D}" type="datetimeFigureOut">
               <a:rPr lang="en-US" smtClean="0"/>
-              <a:t>6/24/20</a:t>
+              <a:t>6/26/20</a:t>
             </a:fld>
             <a:endParaRPr lang="en-US"/>
           </a:p>
@@ -2086,7 +2086,7 @@
           <a:p>
             <a:fld id="{28424D98-A9C0-4FAB-B998-D42542D3343D}" type="datetimeFigureOut">
               <a:rPr lang="en-US" smtClean="0"/>
-              <a:t>6/24/20</a:t>
+              <a:t>6/26/20</a:t>
             </a:fld>
             <a:endParaRPr lang="en-US"/>
           </a:p>
@@ -2374,7 +2374,7 @@
           <a:p>
             <a:fld id="{28424D98-A9C0-4FAB-B998-D42542D3343D}" type="datetimeFigureOut">
               <a:rPr lang="en-US" smtClean="0"/>
-              <a:t>6/24/20</a:t>
+              <a:t>6/26/20</a:t>
             </a:fld>
             <a:endParaRPr lang="en-US"/>
           </a:p>
@@ -2643,7 +2643,7 @@
           <a:p>
             <a:fld id="{28424D98-A9C0-4FAB-B998-D42542D3343D}" type="datetimeFigureOut">
               <a:rPr lang="en-US" smtClean="0"/>
-              <a:t>6/24/20</a:t>
+              <a:t>6/26/20</a:t>
             </a:fld>
             <a:endParaRPr lang="en-US"/>
           </a:p>
@@ -2853,7 +2853,7 @@
           <a:p>
             <a:fld id="{28424D98-A9C0-4FAB-B998-D42542D3343D}" type="datetimeFigureOut">
               <a:rPr lang="en-US" smtClean="0"/>
-              <a:t>6/24/20</a:t>
+              <a:t>6/26/20</a:t>
             </a:fld>
             <a:endParaRPr lang="en-US"/>
           </a:p>
@@ -3432,6 +3432,56 @@
               <a:t>Dittakavi</a:t>
             </a:r>
             <a:endParaRPr lang="en-US" dirty="0"/>
+          </a:p>
+        </p:txBody>
+      </p:sp>
+      <p:sp>
+        <p:nvSpPr>
+          <p:cNvPr id="2" name="Rectangle 1">
+            <a:extLst>
+              <a:ext uri="{FF2B5EF4-FFF2-40B4-BE49-F238E27FC236}">
+                <a16:creationId xmlns:a16="http://schemas.microsoft.com/office/drawing/2014/main" id="{406585F6-4D0C-DE40-8970-63191BC6F6A2}"/>
+              </a:ext>
+            </a:extLst>
+          </p:cNvPr>
+          <p:cNvSpPr/>
+          <p:nvPr/>
+        </p:nvSpPr>
+        <p:spPr>
+          <a:xfrm>
+            <a:off x="1219200" y="362634"/>
+            <a:ext cx="6400800" cy="646331"/>
+          </a:xfrm>
+          <a:prstGeom prst="rect">
+            <a:avLst/>
+          </a:prstGeom>
+        </p:spPr>
+        <p:txBody>
+          <a:bodyPr wrap="square">
+            <a:spAutoFit/>
+          </a:bodyPr>
+          <a:lstStyle/>
+          <a:p>
+            <a:pPr algn="ctr"/>
+            <a:r>
+              <a:rPr lang="en-US" dirty="0">
+                <a:solidFill>
+                  <a:schemeClr val="tx2"/>
+                </a:solidFill>
+              </a:rPr>
+              <a:t>Data Science and Analytics Bootcamp with Stack Education</a:t>
+            </a:r>
+          </a:p>
+          <a:p>
+            <a:pPr algn="ctr"/>
+            <a:r>
+              <a:rPr lang="en-US" dirty="0">
+                <a:solidFill>
+                  <a:schemeClr val="tx2"/>
+                </a:solidFill>
+              </a:rPr>
+              <a:t>Framingham State University</a:t>
+            </a:r>
           </a:p>
         </p:txBody>
       </p:sp>

</xml_diff>